<commit_message>
Update session 28 documents.
</commit_message>
<xml_diff>
--- a/CPSC-24700/Presentations/session-28.pptx
+++ b/CPSC-24700/Presentations/session-28.pptx
@@ -121,6 +121,10 @@
 </p:presentation>
 </file>
 
+<file path=ppt/revisionInfo.xml><?xml version="1.0" encoding="utf-8"?>
+<p1510:revInfo xmlns:a="http://schemas.openxmlformats.org/drawingml/2006/main" xmlns:r="http://schemas.openxmlformats.org/officeDocument/2006/relationships" xmlns:p1510="http://schemas.microsoft.com/office/powerpoint/2015/10/main"/>
+</file>
+
 <file path=ppt/notesMasters/notesMaster1.xml><?xml version="1.0" encoding="utf-8"?>
 <p:notesMaster xmlns:a="http://schemas.openxmlformats.org/drawingml/2006/main" xmlns:r="http://schemas.openxmlformats.org/officeDocument/2006/relationships" xmlns:p="http://schemas.openxmlformats.org/presentationml/2006/main">
   <p:cSld>
@@ -203,7 +207,7 @@
           <a:p>
             <a:fld id="{1CF91C02-A59E-4778-8D4F-4840DBBEFA68}" type="datetimeFigureOut">
               <a:rPr lang="en-US" smtClean="0"/>
-              <a:t>11/2/2017</a:t>
+              <a:t>11/3/2017</a:t>
             </a:fld>
             <a:endParaRPr lang="en-US"/>
           </a:p>
@@ -1213,7 +1217,7 @@
           <a:p>
             <a:fld id="{5FB62F81-FD80-4AA8-93CA-E835B40BE667}" type="datetimeFigureOut">
               <a:rPr lang="en-US" smtClean="0"/>
-              <a:t>11/2/2017</a:t>
+              <a:t>11/3/2017</a:t>
             </a:fld>
             <a:endParaRPr lang="en-US"/>
           </a:p>
@@ -1411,7 +1415,7 @@
           <a:p>
             <a:fld id="{5FB62F81-FD80-4AA8-93CA-E835B40BE667}" type="datetimeFigureOut">
               <a:rPr lang="en-US" smtClean="0"/>
-              <a:t>11/2/2017</a:t>
+              <a:t>11/3/2017</a:t>
             </a:fld>
             <a:endParaRPr lang="en-US"/>
           </a:p>
@@ -1619,7 +1623,7 @@
           <a:p>
             <a:fld id="{5FB62F81-FD80-4AA8-93CA-E835B40BE667}" type="datetimeFigureOut">
               <a:rPr lang="en-US" smtClean="0"/>
-              <a:t>11/2/2017</a:t>
+              <a:t>11/3/2017</a:t>
             </a:fld>
             <a:endParaRPr lang="en-US"/>
           </a:p>
@@ -1817,7 +1821,7 @@
           <a:p>
             <a:fld id="{5FB62F81-FD80-4AA8-93CA-E835B40BE667}" type="datetimeFigureOut">
               <a:rPr lang="en-US" smtClean="0"/>
-              <a:t>11/2/2017</a:t>
+              <a:t>11/3/2017</a:t>
             </a:fld>
             <a:endParaRPr lang="en-US"/>
           </a:p>
@@ -2092,7 +2096,7 @@
           <a:p>
             <a:fld id="{5FB62F81-FD80-4AA8-93CA-E835B40BE667}" type="datetimeFigureOut">
               <a:rPr lang="en-US" smtClean="0"/>
-              <a:t>11/2/2017</a:t>
+              <a:t>11/3/2017</a:t>
             </a:fld>
             <a:endParaRPr lang="en-US"/>
           </a:p>
@@ -2357,7 +2361,7 @@
           <a:p>
             <a:fld id="{5FB62F81-FD80-4AA8-93CA-E835B40BE667}" type="datetimeFigureOut">
               <a:rPr lang="en-US" smtClean="0"/>
-              <a:t>11/2/2017</a:t>
+              <a:t>11/3/2017</a:t>
             </a:fld>
             <a:endParaRPr lang="en-US"/>
           </a:p>
@@ -2769,7 +2773,7 @@
           <a:p>
             <a:fld id="{5FB62F81-FD80-4AA8-93CA-E835B40BE667}" type="datetimeFigureOut">
               <a:rPr lang="en-US" smtClean="0"/>
-              <a:t>11/2/2017</a:t>
+              <a:t>11/3/2017</a:t>
             </a:fld>
             <a:endParaRPr lang="en-US"/>
           </a:p>
@@ -2910,7 +2914,7 @@
           <a:p>
             <a:fld id="{5FB62F81-FD80-4AA8-93CA-E835B40BE667}" type="datetimeFigureOut">
               <a:rPr lang="en-US" smtClean="0"/>
-              <a:t>11/2/2017</a:t>
+              <a:t>11/3/2017</a:t>
             </a:fld>
             <a:endParaRPr lang="en-US"/>
           </a:p>
@@ -3023,7 +3027,7 @@
           <a:p>
             <a:fld id="{5FB62F81-FD80-4AA8-93CA-E835B40BE667}" type="datetimeFigureOut">
               <a:rPr lang="en-US" smtClean="0"/>
-              <a:t>11/2/2017</a:t>
+              <a:t>11/3/2017</a:t>
             </a:fld>
             <a:endParaRPr lang="en-US"/>
           </a:p>
@@ -3334,7 +3338,7 @@
           <a:p>
             <a:fld id="{5FB62F81-FD80-4AA8-93CA-E835B40BE667}" type="datetimeFigureOut">
               <a:rPr lang="en-US" smtClean="0"/>
-              <a:t>11/2/2017</a:t>
+              <a:t>11/3/2017</a:t>
             </a:fld>
             <a:endParaRPr lang="en-US"/>
           </a:p>
@@ -3622,7 +3626,7 @@
           <a:p>
             <a:fld id="{5FB62F81-FD80-4AA8-93CA-E835B40BE667}" type="datetimeFigureOut">
               <a:rPr lang="en-US" smtClean="0"/>
-              <a:t>11/2/2017</a:t>
+              <a:t>11/3/2017</a:t>
             </a:fld>
             <a:endParaRPr lang="en-US"/>
           </a:p>
@@ -3863,7 +3867,7 @@
           <a:p>
             <a:fld id="{5FB62F81-FD80-4AA8-93CA-E835B40BE667}" type="datetimeFigureOut">
               <a:rPr lang="en-US" smtClean="0"/>
-              <a:t>11/2/2017</a:t>
+              <a:t>11/3/2017</a:t>
             </a:fld>
             <a:endParaRPr lang="en-US"/>
           </a:p>
@@ -4417,7 +4421,7 @@
             </a:pPr>
             <a:r>
               <a:rPr lang="en-US" sz="2000" dirty="0"/>
-              <a:t>Project 4: Contact Manager Q&amp;A</a:t>
+              <a:t>Project 4: Contact Manager Lab</a:t>
             </a:r>
           </a:p>
           <a:p>
@@ -4854,6 +4858,12 @@
             <a:r>
               <a:rPr lang="en-US" sz="2000" dirty="0"/>
               <a:t>Project 4: Contact Manager (client)</a:t>
+            </a:r>
+          </a:p>
+          <a:p>
+            <a:r>
+              <a:rPr lang="en-US" sz="2000" dirty="0"/>
+              <a:t>Complete Ch.9.1 through 9.4 on PHP</a:t>
             </a:r>
           </a:p>
           <a:p>

</xml_diff>